<commit_message>
egy-két figyelmen kívűl hagyott magyar szó át lett fordítva
</commit_message>
<xml_diff>
--- a/Prezentációk/Projekt_English.pptx
+++ b/Prezentációk/Projekt_English.pptx
@@ -17494,11 +17494,7 @@
             </a:pPr>
             <a:r>
               <a:rPr lang="hu-HU"/>
-              <a:t>Topol</a:t>
-            </a:r>
-            <a:r>
-              <a:rPr lang="hu-HU"/>
-              <a:t>ógia</a:t>
+              <a:t>Topology</a:t>
             </a:r>
             <a:endParaRPr/>
           </a:p>
@@ -18431,7 +18427,7 @@
           </a:bodyPr>
           <a:lstStyle/>
           <a:p>
-            <a:pPr indent="-342900" lvl="0" marL="457200" rtl="0" algn="l">
+            <a:pPr indent="-361950" lvl="0" marL="457200" rtl="0" algn="l">
               <a:lnSpc>
                 <a:spcPct val="90000"/>
               </a:lnSpc>
@@ -18441,24 +18437,62 @@
               <a:spcAft>
                 <a:spcPts val="0"/>
               </a:spcAft>
-              <a:buClr>
-                <a:schemeClr val="dk1"/>
-              </a:buClr>
-              <a:buSzPts val="1800"/>
+              <a:buSzPts val="2100"/>
               <a:buChar char="•"/>
             </a:pPr>
             <a:r>
-              <a:rPr lang="hu-HU"/>
-              <a:t>Az eszközök ip címét kinézni az ipcim.xlsx-ből</a:t>
+              <a:rPr lang="hu-HU" sz="2400">
+                <a:highlight>
+                  <a:schemeClr val="lt1"/>
+                </a:highlight>
+                <a:latin typeface="Arial"/>
+                <a:ea typeface="Arial"/>
+                <a:cs typeface="Arial"/>
+                <a:sym typeface="Arial"/>
+              </a:rPr>
+              <a:t>To look up the ip address of the devices from ipcim.xlsx</a:t>
             </a:r>
-            <a:br>
-              <a:rPr lang="hu-HU"/>
-            </a:br>
+            <a:endParaRPr sz="2400">
+              <a:highlight>
+                <a:schemeClr val="lt1"/>
+              </a:highlight>
+              <a:latin typeface="Arial"/>
+              <a:ea typeface="Arial"/>
+              <a:cs typeface="Arial"/>
+              <a:sym typeface="Arial"/>
+            </a:endParaRPr>
+          </a:p>
+          <a:p>
+            <a:pPr indent="-361950" lvl="0" marL="457200" marR="38100" rtl="0" algn="l">
+              <a:lnSpc>
+                <a:spcPct val="128571"/>
+              </a:lnSpc>
+              <a:spcBef>
+                <a:spcPts val="0"/>
+              </a:spcBef>
+              <a:spcAft>
+                <a:spcPts val="0"/>
+              </a:spcAft>
+              <a:buSzPts val="2100"/>
+              <a:buChar char="•"/>
+            </a:pPr>
             <a:r>
-              <a:rPr lang="hu-HU"/>
-              <a:t>és beállítani az adott eszközön</a:t>
+              <a:rPr lang="hu-HU" sz="2400">
+                <a:highlight>
+                  <a:schemeClr val="lt1"/>
+                </a:highlight>
+                <a:latin typeface="Arial"/>
+                <a:ea typeface="Arial"/>
+                <a:cs typeface="Arial"/>
+                <a:sym typeface="Arial"/>
+              </a:rPr>
+              <a:t>and set on the given device</a:t>
             </a:r>
-            <a:endParaRPr/>
+            <a:endParaRPr sz="3100">
+              <a:highlight>
+                <a:schemeClr val="lt1"/>
+              </a:highlight>
+            </a:endParaRPr>
           </a:p>
         </p:txBody>
       </p:sp>

</xml_diff>